<commit_message>
Udpate for deployment of app
</commit_message>
<xml_diff>
--- a/Spotify Data Presentation.pptx
+++ b/Spotify Data Presentation.pptx
@@ -210,7 +210,7 @@
           <a:p>
             <a:fld id="{E5F40EF8-8A1B-EC41-B37E-EDBB89CD72B1}" type="datetimeFigureOut">
               <a:rPr lang="en-US" smtClean="0"/>
-              <a:t>8/13/25</a:t>
+              <a:t>8/23/25</a:t>
             </a:fld>
             <a:endParaRPr lang="en-US"/>
           </a:p>
@@ -1284,7 +1284,7 @@
             <a:fld id="{B61BEF0D-F0BB-DE4B-95CE-6DB70DBA9567}" type="datetimeFigureOut">
               <a:rPr lang="en-US" dirty="0"/>
               <a:pPr/>
-              <a:t>8/12/25</a:t>
+              <a:t>8/23/25</a:t>
             </a:fld>
             <a:endParaRPr lang="en-US" dirty="0"/>
           </a:p>
@@ -1532,7 +1532,7 @@
             <a:fld id="{B61BEF0D-F0BB-DE4B-95CE-6DB70DBA9567}" type="datetimeFigureOut">
               <a:rPr lang="en-US" dirty="0"/>
               <a:pPr/>
-              <a:t>8/12/25</a:t>
+              <a:t>8/24/25</a:t>
             </a:fld>
             <a:endParaRPr lang="en-US" dirty="0"/>
           </a:p>
@@ -1843,7 +1843,7 @@
             <a:fld id="{B61BEF0D-F0BB-DE4B-95CE-6DB70DBA9567}" type="datetimeFigureOut">
               <a:rPr lang="en-US" dirty="0"/>
               <a:pPr/>
-              <a:t>8/12/25</a:t>
+              <a:t>8/24/25</a:t>
             </a:fld>
             <a:endParaRPr lang="en-US" dirty="0"/>
           </a:p>
@@ -2181,7 +2181,7 @@
             <a:fld id="{B61BEF0D-F0BB-DE4B-95CE-6DB70DBA9567}" type="datetimeFigureOut">
               <a:rPr lang="en-US" dirty="0"/>
               <a:pPr/>
-              <a:t>8/12/25</a:t>
+              <a:t>8/24/25</a:t>
             </a:fld>
             <a:endParaRPr lang="en-US" dirty="0"/>
           </a:p>
@@ -2492,7 +2492,7 @@
             <a:fld id="{B61BEF0D-F0BB-DE4B-95CE-6DB70DBA9567}" type="datetimeFigureOut">
               <a:rPr lang="en-US" dirty="0"/>
               <a:pPr/>
-              <a:t>8/12/25</a:t>
+              <a:t>8/24/25</a:t>
             </a:fld>
             <a:endParaRPr lang="en-US" dirty="0"/>
           </a:p>
@@ -2882,7 +2882,7 @@
             <a:fld id="{B61BEF0D-F0BB-DE4B-95CE-6DB70DBA9567}" type="datetimeFigureOut">
               <a:rPr lang="en-US" dirty="0"/>
               <a:pPr/>
-              <a:t>8/12/25</a:t>
+              <a:t>8/24/25</a:t>
             </a:fld>
             <a:endParaRPr lang="en-US" dirty="0"/>
           </a:p>
@@ -3048,7 +3048,7 @@
           <a:p>
             <a:fld id="{55C6B4A9-1611-4792-9094-5F34BCA07E0B}" type="datetimeFigureOut">
               <a:rPr lang="en-US" dirty="0"/>
-              <a:t>8/12/25</a:t>
+              <a:t>8/24/25</a:t>
             </a:fld>
             <a:endParaRPr lang="en-US" dirty="0"/>
           </a:p>
@@ -3224,7 +3224,7 @@
             <a:fld id="{B61BEF0D-F0BB-DE4B-95CE-6DB70DBA9567}" type="datetimeFigureOut">
               <a:rPr lang="en-US" dirty="0"/>
               <a:pPr/>
-              <a:t>8/12/25</a:t>
+              <a:t>8/24/25</a:t>
             </a:fld>
             <a:endParaRPr lang="en-US" dirty="0"/>
           </a:p>
@@ -3397,7 +3397,7 @@
             <a:fld id="{B61BEF0D-F0BB-DE4B-95CE-6DB70DBA9567}" type="datetimeFigureOut">
               <a:rPr lang="en-US" dirty="0"/>
               <a:pPr/>
-              <a:t>8/12/25</a:t>
+              <a:t>8/23/25</a:t>
             </a:fld>
             <a:endParaRPr lang="en-US" dirty="0"/>
           </a:p>
@@ -3641,7 +3641,7 @@
             <a:fld id="{B61BEF0D-F0BB-DE4B-95CE-6DB70DBA9567}" type="datetimeFigureOut">
               <a:rPr lang="en-US" dirty="0"/>
               <a:pPr/>
-              <a:t>8/12/25</a:t>
+              <a:t>8/24/25</a:t>
             </a:fld>
             <a:endParaRPr lang="en-US" dirty="0"/>
           </a:p>
@@ -3869,7 +3869,7 @@
           <a:p>
             <a:fld id="{EB712588-04B1-427B-82EE-E8DB90309F08}" type="datetimeFigureOut">
               <a:rPr lang="en-US" dirty="0"/>
-              <a:t>8/12/25</a:t>
+              <a:t>8/24/25</a:t>
             </a:fld>
             <a:endParaRPr lang="en-US" dirty="0"/>
           </a:p>
@@ -4239,7 +4239,7 @@
             <a:fld id="{B61BEF0D-F0BB-DE4B-95CE-6DB70DBA9567}" type="datetimeFigureOut">
               <a:rPr lang="en-US" dirty="0"/>
               <a:pPr/>
-              <a:t>8/12/25</a:t>
+              <a:t>8/24/25</a:t>
             </a:fld>
             <a:endParaRPr lang="en-US" dirty="0"/>
           </a:p>
@@ -4359,7 +4359,7 @@
             <a:fld id="{B61BEF0D-F0BB-DE4B-95CE-6DB70DBA9567}" type="datetimeFigureOut">
               <a:rPr lang="en-US" dirty="0"/>
               <a:pPr/>
-              <a:t>8/12/25</a:t>
+              <a:t>8/23/25</a:t>
             </a:fld>
             <a:endParaRPr lang="en-US" dirty="0"/>
           </a:p>
@@ -4451,7 +4451,7 @@
             <a:fld id="{B61BEF0D-F0BB-DE4B-95CE-6DB70DBA9567}" type="datetimeFigureOut">
               <a:rPr lang="en-US" dirty="0"/>
               <a:pPr/>
-              <a:t>8/12/25</a:t>
+              <a:t>8/24/25</a:t>
             </a:fld>
             <a:endParaRPr lang="en-US" dirty="0"/>
           </a:p>
@@ -4702,7 +4702,7 @@
           <a:p>
             <a:fld id="{42A54C80-263E-416B-A8E0-580EDEADCBDC}" type="datetimeFigureOut">
               <a:rPr lang="en-US" dirty="0"/>
-              <a:t>8/12/25</a:t>
+              <a:t>8/24/25</a:t>
             </a:fld>
             <a:endParaRPr lang="en-US" dirty="0"/>
           </a:p>
@@ -4961,7 +4961,7 @@
             <a:fld id="{B61BEF0D-F0BB-DE4B-95CE-6DB70DBA9567}" type="datetimeFigureOut">
               <a:rPr lang="en-US" dirty="0"/>
               <a:pPr/>
-              <a:t>8/12/25</a:t>
+              <a:t>8/24/25</a:t>
             </a:fld>
             <a:endParaRPr lang="en-US" dirty="0"/>
           </a:p>
@@ -5701,7 +5701,7 @@
             <a:fld id="{B61BEF0D-F0BB-DE4B-95CE-6DB70DBA9567}" type="datetimeFigureOut">
               <a:rPr lang="en-US" dirty="0"/>
               <a:pPr/>
-              <a:t>8/12/25</a:t>
+              <a:t>8/23/25</a:t>
             </a:fld>
             <a:endParaRPr lang="en-US" dirty="0"/>
           </a:p>
@@ -6287,7 +6287,7 @@
           <a:p>
             <a:r>
               <a:rPr lang="en-US" dirty="0"/>
-              <a:t>8/9/25</a:t>
+              <a:t>8/29/25</a:t>
             </a:r>
           </a:p>
         </p:txBody>

</xml_diff>